<commit_message>
update report doc & slide
</commit_message>
<xml_diff>
--- a/GAME2005_A2_LeTrung_ShuDeng/_Assignment Video Start.pptx
+++ b/GAME2005_A2_LeTrung_ShuDeng/_Assignment Video Start.pptx
@@ -297,7 +297,7 @@
               <a:pPr>
                 <a:defRPr/>
               </a:pPr>
-              <a:t>10/10/2020</a:t>
+              <a:t>10/25/2020</a:t>
             </a:fld>
             <a:endParaRPr lang="en-US" dirty="0"/>
           </a:p>
@@ -2704,7 +2704,7 @@
         <p:spPr>
           <a:xfrm>
             <a:off x="1828800" y="5181952"/>
-            <a:ext cx="6893890" cy="830997"/>
+            <a:ext cx="6893890" cy="1200329"/>
           </a:xfrm>
           <a:prstGeom prst="rect">
             <a:avLst/>
@@ -2725,19 +2725,27 @@
           <a:p>
             <a:r>
               <a:rPr lang="en-US" dirty="0"/>
-              <a:t>	</a:t>
-            </a:r>
-            <a:r>
-              <a:rPr lang="en-US"/>
-              <a:t>Assignment 1 - Motion </a:t>
+              <a:t>	Assignment </a:t>
+            </a:r>
+            <a:r>
+              <a:rPr lang="en-US" dirty="0" smtClean="0"/>
+              <a:t>2 </a:t>
             </a:r>
             <a:r>
               <a:rPr lang="en-US" dirty="0"/>
-              <a:t>in 1 and </a:t>
-            </a:r>
-            <a:r>
-              <a:rPr lang="en-US"/>
-              <a:t>2 Directions</a:t>
+              <a:t>- </a:t>
+            </a:r>
+            <a:r>
+              <a:rPr lang="en-US" dirty="0"/>
+              <a:t>Projectile Motion, Circular Motion, Free body diagrams </a:t>
+            </a:r>
+            <a:r>
+              <a:rPr lang="en-US" dirty="0" smtClean="0"/>
+              <a:t>and Newton's </a:t>
+            </a:r>
+            <a:r>
+              <a:rPr lang="en-US" dirty="0"/>
+              <a:t>Laws</a:t>
             </a:r>
             <a:endParaRPr lang="en-US" dirty="0"/>
           </a:p>
@@ -3017,7 +3025,7 @@
         </p:spPr>
         <p:txBody>
           <a:bodyPr>
-            <a:normAutofit fontScale="92500" lnSpcReduction="20000"/>
+            <a:normAutofit fontScale="92500" lnSpcReduction="10000"/>
           </a:bodyPr>
           <a:lstStyle/>
           <a:p>
@@ -3193,7 +3201,7 @@
           <p:nvPr/>
         </p:nvPicPr>
         <p:blipFill>
-          <a:blip r:embed="rId2">
+          <a:blip r:embed="rId2" cstate="hqprint">
             <a:extLst>
               <a:ext uri="{28A0092B-C50C-407E-A947-70E740481C1C}">
                 <a14:useLocalDpi xmlns:a14="http://schemas.microsoft.com/office/drawing/2010/main" val="0"/>

</xml_diff>